<commit_message>
TP3 miseau prope 22_30
</commit_message>
<xml_diff>
--- a/TP3/Image à faire.pptx
+++ b/TP3/Image à faire.pptx
@@ -7,6 +7,7 @@
   <p:sldIdLst>
     <p:sldId id="257" r:id="rId2"/>
     <p:sldId id="256" r:id="rId3"/>
+    <p:sldId id="258" r:id="rId4"/>
   </p:sldIdLst>
   <p:sldSz cx="12192000" cy="6858000"/>
   <p:notesSz cx="6858000" cy="9144000"/>
@@ -105,6 +106,11 @@
       </a:defRPr>
     </a:lvl9pPr>
   </p:defaultTextStyle>
+  <p:extLst>
+    <p:ext uri="{EFAFB233-063F-42B5-8137-9DF3F51BA10A}">
+      <p15:sldGuideLst xmlns:p15="http://schemas.microsoft.com/office/powerpoint/2012/main"/>
+    </p:ext>
+  </p:extLst>
 </p:presentation>
 </file>
 
@@ -239,7 +245,7 @@
           <a:p>
             <a:fld id="{79C2D82C-7566-4D58-820A-B8A97EB2C316}" type="datetimeFigureOut">
               <a:rPr lang="en-US" smtClean="0"/>
-              <a:t>2/7/2017</a:t>
+              <a:t>2/8/2017</a:t>
             </a:fld>
             <a:endParaRPr lang="en-US"/>
           </a:p>
@@ -409,7 +415,7 @@
           <a:p>
             <a:fld id="{79C2D82C-7566-4D58-820A-B8A97EB2C316}" type="datetimeFigureOut">
               <a:rPr lang="en-US" smtClean="0"/>
-              <a:t>2/7/2017</a:t>
+              <a:t>2/8/2017</a:t>
             </a:fld>
             <a:endParaRPr lang="en-US"/>
           </a:p>
@@ -589,7 +595,7 @@
           <a:p>
             <a:fld id="{79C2D82C-7566-4D58-820A-B8A97EB2C316}" type="datetimeFigureOut">
               <a:rPr lang="en-US" smtClean="0"/>
-              <a:t>2/7/2017</a:t>
+              <a:t>2/8/2017</a:t>
             </a:fld>
             <a:endParaRPr lang="en-US"/>
           </a:p>
@@ -759,7 +765,7 @@
           <a:p>
             <a:fld id="{79C2D82C-7566-4D58-820A-B8A97EB2C316}" type="datetimeFigureOut">
               <a:rPr lang="en-US" smtClean="0"/>
-              <a:t>2/7/2017</a:t>
+              <a:t>2/8/2017</a:t>
             </a:fld>
             <a:endParaRPr lang="en-US"/>
           </a:p>
@@ -1005,7 +1011,7 @@
           <a:p>
             <a:fld id="{79C2D82C-7566-4D58-820A-B8A97EB2C316}" type="datetimeFigureOut">
               <a:rPr lang="en-US" smtClean="0"/>
-              <a:t>2/7/2017</a:t>
+              <a:t>2/8/2017</a:t>
             </a:fld>
             <a:endParaRPr lang="en-US"/>
           </a:p>
@@ -1237,7 +1243,7 @@
           <a:p>
             <a:fld id="{79C2D82C-7566-4D58-820A-B8A97EB2C316}" type="datetimeFigureOut">
               <a:rPr lang="en-US" smtClean="0"/>
-              <a:t>2/7/2017</a:t>
+              <a:t>2/8/2017</a:t>
             </a:fld>
             <a:endParaRPr lang="en-US"/>
           </a:p>
@@ -1604,7 +1610,7 @@
           <a:p>
             <a:fld id="{79C2D82C-7566-4D58-820A-B8A97EB2C316}" type="datetimeFigureOut">
               <a:rPr lang="en-US" smtClean="0"/>
-              <a:t>2/7/2017</a:t>
+              <a:t>2/8/2017</a:t>
             </a:fld>
             <a:endParaRPr lang="en-US"/>
           </a:p>
@@ -1722,7 +1728,7 @@
           <a:p>
             <a:fld id="{79C2D82C-7566-4D58-820A-B8A97EB2C316}" type="datetimeFigureOut">
               <a:rPr lang="en-US" smtClean="0"/>
-              <a:t>2/7/2017</a:t>
+              <a:t>2/8/2017</a:t>
             </a:fld>
             <a:endParaRPr lang="en-US"/>
           </a:p>
@@ -1817,7 +1823,7 @@
           <a:p>
             <a:fld id="{79C2D82C-7566-4D58-820A-B8A97EB2C316}" type="datetimeFigureOut">
               <a:rPr lang="en-US" smtClean="0"/>
-              <a:t>2/7/2017</a:t>
+              <a:t>2/8/2017</a:t>
             </a:fld>
             <a:endParaRPr lang="en-US"/>
           </a:p>
@@ -2094,7 +2100,7 @@
           <a:p>
             <a:fld id="{79C2D82C-7566-4D58-820A-B8A97EB2C316}" type="datetimeFigureOut">
               <a:rPr lang="en-US" smtClean="0"/>
-              <a:t>2/7/2017</a:t>
+              <a:t>2/8/2017</a:t>
             </a:fld>
             <a:endParaRPr lang="en-US"/>
           </a:p>
@@ -2347,7 +2353,7 @@
           <a:p>
             <a:fld id="{79C2D82C-7566-4D58-820A-B8A97EB2C316}" type="datetimeFigureOut">
               <a:rPr lang="en-US" smtClean="0"/>
-              <a:t>2/7/2017</a:t>
+              <a:t>2/8/2017</a:t>
             </a:fld>
             <a:endParaRPr lang="en-US"/>
           </a:p>
@@ -2560,7 +2566,7 @@
           <a:p>
             <a:fld id="{79C2D82C-7566-4D58-820A-B8A97EB2C316}" type="datetimeFigureOut">
               <a:rPr lang="en-US" smtClean="0"/>
-              <a:t>2/7/2017</a:t>
+              <a:t>2/8/2017</a:t>
             </a:fld>
             <a:endParaRPr lang="en-US"/>
           </a:p>
@@ -3016,12 +3022,8 @@
               <a:buNone/>
             </a:pPr>
             <a:r>
-              <a:rPr lang="fr-FR" smtClean="0"/>
-              <a:t>Question 25 </a:t>
-            </a:r>
-            <a:r>
               <a:rPr lang="fr-FR" dirty="0" smtClean="0"/>
-              <a:t>: image </a:t>
+              <a:t>Question 25 : image </a:t>
             </a:r>
             <a:r>
               <a:rPr lang="fr-FR" dirty="0" err="1" smtClean="0"/>
@@ -3035,6 +3037,26 @@
               <a:rPr lang="fr-FR" dirty="0" err="1" smtClean="0"/>
               <a:t>reception</a:t>
             </a:r>
+            <a:endParaRPr lang="fr-FR" dirty="0" smtClean="0"/>
+          </a:p>
+          <a:p>
+            <a:pPr marL="0" indent="0">
+              <a:buNone/>
+            </a:pPr>
+            <a:r>
+              <a:rPr lang="fr-FR" dirty="0" smtClean="0"/>
+              <a:t>Question 27 : image 27 serveur puis client </a:t>
+            </a:r>
+            <a:r>
+              <a:rPr lang="fr-FR" dirty="0" err="1" smtClean="0"/>
+              <a:t>accept</a:t>
+            </a:r>
+            <a:endParaRPr lang="fr-FR" dirty="0" smtClean="0"/>
+          </a:p>
+          <a:p>
+            <a:pPr marL="0" indent="0">
+              <a:buNone/>
+            </a:pPr>
             <a:endParaRPr lang="en-US" dirty="0"/>
           </a:p>
         </p:txBody>
@@ -3131,6 +3153,1625 @@
     <p:extLst>
       <p:ext uri="{BB962C8B-B14F-4D97-AF65-F5344CB8AC3E}">
         <p14:creationId xmlns:p14="http://schemas.microsoft.com/office/powerpoint/2010/main" val="4005969821"/>
+      </p:ext>
+    </p:extLst>
+  </p:cSld>
+  <p:clrMapOvr>
+    <a:masterClrMapping/>
+  </p:clrMapOvr>
+</p:sld>
+</file>
+
+<file path=ppt/slides/slide3.xml><?xml version="1.0" encoding="utf-8"?>
+<p:sld xmlns:a="http://schemas.openxmlformats.org/drawingml/2006/main" xmlns:r="http://schemas.openxmlformats.org/officeDocument/2006/relationships" xmlns:p="http://schemas.openxmlformats.org/presentationml/2006/main">
+  <p:cSld>
+    <p:spTree>
+      <p:nvGrpSpPr>
+        <p:cNvPr id="1" name=""/>
+        <p:cNvGrpSpPr/>
+        <p:nvPr/>
+      </p:nvGrpSpPr>
+      <p:grpSpPr>
+        <a:xfrm>
+          <a:off x="0" y="0"/>
+          <a:ext cx="0" cy="0"/>
+          <a:chOff x="0" y="0"/>
+          <a:chExt cx="0" cy="0"/>
+        </a:xfrm>
+      </p:grpSpPr>
+      <p:grpSp>
+        <p:nvGrpSpPr>
+          <p:cNvPr id="137" name="Groupe 136"/>
+          <p:cNvGrpSpPr/>
+          <p:nvPr/>
+        </p:nvGrpSpPr>
+        <p:grpSpPr>
+          <a:xfrm>
+            <a:off x="1480401" y="54428"/>
+            <a:ext cx="10548314" cy="6701028"/>
+            <a:chOff x="1480401" y="54428"/>
+            <a:chExt cx="10548314" cy="6701028"/>
+          </a:xfrm>
+        </p:grpSpPr>
+        <p:sp>
+          <p:nvSpPr>
+            <p:cNvPr id="35" name="Ellipse 34"/>
+            <p:cNvSpPr/>
+            <p:nvPr/>
+          </p:nvSpPr>
+          <p:spPr>
+            <a:xfrm>
+              <a:off x="1480401" y="54428"/>
+              <a:ext cx="1600200" cy="783771"/>
+            </a:xfrm>
+            <a:prstGeom prst="ellipse">
+              <a:avLst/>
+            </a:prstGeom>
+            <a:noFill/>
+            <a:ln>
+              <a:solidFill>
+                <a:schemeClr val="tx1"/>
+              </a:solidFill>
+            </a:ln>
+          </p:spPr>
+          <p:style>
+            <a:lnRef idx="2">
+              <a:schemeClr val="accent1">
+                <a:shade val="50000"/>
+              </a:schemeClr>
+            </a:lnRef>
+            <a:fillRef idx="1">
+              <a:schemeClr val="accent1"/>
+            </a:fillRef>
+            <a:effectRef idx="0">
+              <a:schemeClr val="accent1"/>
+            </a:effectRef>
+            <a:fontRef idx="minor">
+              <a:schemeClr val="lt1"/>
+            </a:fontRef>
+          </p:style>
+          <p:txBody>
+            <a:bodyPr lIns="0" tIns="0" rIns="0" bIns="0" rtlCol="0" anchor="ctr"/>
+            <a:lstStyle/>
+            <a:p>
+              <a:pPr algn="ctr"/>
+              <a:r>
+                <a:rPr lang="en-US" dirty="0" smtClean="0">
+                  <a:solidFill>
+                    <a:schemeClr val="tx1"/>
+                  </a:solidFill>
+                </a:rPr>
+                <a:t>Client</a:t>
+              </a:r>
+              <a:endParaRPr lang="en-US" dirty="0">
+                <a:solidFill>
+                  <a:schemeClr val="tx1"/>
+                </a:solidFill>
+              </a:endParaRPr>
+            </a:p>
+          </p:txBody>
+        </p:sp>
+        <p:sp>
+          <p:nvSpPr>
+            <p:cNvPr id="36" name="Ellipse 35"/>
+            <p:cNvSpPr/>
+            <p:nvPr/>
+          </p:nvSpPr>
+          <p:spPr>
+            <a:xfrm>
+              <a:off x="10428515" y="54428"/>
+              <a:ext cx="1600200" cy="783771"/>
+            </a:xfrm>
+            <a:prstGeom prst="ellipse">
+              <a:avLst/>
+            </a:prstGeom>
+            <a:noFill/>
+            <a:ln>
+              <a:solidFill>
+                <a:schemeClr val="tx1"/>
+              </a:solidFill>
+            </a:ln>
+          </p:spPr>
+          <p:style>
+            <a:lnRef idx="2">
+              <a:schemeClr val="accent1">
+                <a:shade val="50000"/>
+              </a:schemeClr>
+            </a:lnRef>
+            <a:fillRef idx="1">
+              <a:schemeClr val="accent1"/>
+            </a:fillRef>
+            <a:effectRef idx="0">
+              <a:schemeClr val="accent1"/>
+            </a:effectRef>
+            <a:fontRef idx="minor">
+              <a:schemeClr val="lt1"/>
+            </a:fontRef>
+          </p:style>
+          <p:txBody>
+            <a:bodyPr lIns="0" tIns="0" rIns="0" bIns="0" rtlCol="0" anchor="ctr"/>
+            <a:lstStyle/>
+            <a:p>
+              <a:pPr algn="ctr"/>
+              <a:r>
+                <a:rPr lang="en-US" dirty="0" err="1">
+                  <a:solidFill>
+                    <a:schemeClr val="tx1"/>
+                  </a:solidFill>
+                </a:rPr>
+                <a:t>S</a:t>
+              </a:r>
+              <a:r>
+                <a:rPr lang="en-US" dirty="0" err="1" smtClean="0">
+                  <a:solidFill>
+                    <a:schemeClr val="tx1"/>
+                  </a:solidFill>
+                </a:rPr>
+                <a:t>erveur</a:t>
+              </a:r>
+              <a:endParaRPr lang="en-US" dirty="0">
+                <a:solidFill>
+                  <a:schemeClr val="tx1"/>
+                </a:solidFill>
+              </a:endParaRPr>
+            </a:p>
+          </p:txBody>
+        </p:sp>
+        <p:sp>
+          <p:nvSpPr>
+            <p:cNvPr id="37" name="Ellipse 36"/>
+            <p:cNvSpPr/>
+            <p:nvPr/>
+          </p:nvSpPr>
+          <p:spPr>
+            <a:xfrm>
+              <a:off x="2732314" y="992148"/>
+              <a:ext cx="1600200" cy="783771"/>
+            </a:xfrm>
+            <a:prstGeom prst="ellipse">
+              <a:avLst/>
+            </a:prstGeom>
+            <a:noFill/>
+            <a:ln>
+              <a:solidFill>
+                <a:schemeClr val="tx1"/>
+              </a:solidFill>
+            </a:ln>
+          </p:spPr>
+          <p:style>
+            <a:lnRef idx="2">
+              <a:schemeClr val="accent1">
+                <a:shade val="50000"/>
+              </a:schemeClr>
+            </a:lnRef>
+            <a:fillRef idx="1">
+              <a:schemeClr val="accent1"/>
+            </a:fillRef>
+            <a:effectRef idx="0">
+              <a:schemeClr val="accent1"/>
+            </a:effectRef>
+            <a:fontRef idx="minor">
+              <a:schemeClr val="lt1"/>
+            </a:fontRef>
+          </p:style>
+          <p:txBody>
+            <a:bodyPr lIns="0" tIns="0" rIns="0" bIns="0" rtlCol="0" anchor="ctr"/>
+            <a:lstStyle/>
+            <a:p>
+              <a:pPr algn="ctr"/>
+              <a:r>
+                <a:rPr lang="en-US" dirty="0" err="1" smtClean="0">
+                  <a:solidFill>
+                    <a:schemeClr val="tx1"/>
+                  </a:solidFill>
+                </a:rPr>
+                <a:t>Fermée</a:t>
+              </a:r>
+              <a:endParaRPr lang="en-US" dirty="0">
+                <a:solidFill>
+                  <a:schemeClr val="tx1"/>
+                </a:solidFill>
+              </a:endParaRPr>
+            </a:p>
+          </p:txBody>
+        </p:sp>
+        <p:sp>
+          <p:nvSpPr>
+            <p:cNvPr id="38" name="Ellipse 37"/>
+            <p:cNvSpPr/>
+            <p:nvPr/>
+          </p:nvSpPr>
+          <p:spPr>
+            <a:xfrm>
+              <a:off x="9285514" y="939267"/>
+              <a:ext cx="1600200" cy="783771"/>
+            </a:xfrm>
+            <a:prstGeom prst="ellipse">
+              <a:avLst/>
+            </a:prstGeom>
+            <a:noFill/>
+            <a:ln>
+              <a:solidFill>
+                <a:schemeClr val="tx1"/>
+              </a:solidFill>
+            </a:ln>
+          </p:spPr>
+          <p:style>
+            <a:lnRef idx="2">
+              <a:schemeClr val="accent1">
+                <a:shade val="50000"/>
+              </a:schemeClr>
+            </a:lnRef>
+            <a:fillRef idx="1">
+              <a:schemeClr val="accent1"/>
+            </a:fillRef>
+            <a:effectRef idx="0">
+              <a:schemeClr val="accent1"/>
+            </a:effectRef>
+            <a:fontRef idx="minor">
+              <a:schemeClr val="lt1"/>
+            </a:fontRef>
+          </p:style>
+          <p:txBody>
+            <a:bodyPr lIns="0" tIns="0" rIns="0" bIns="0" rtlCol="0" anchor="ctr"/>
+            <a:lstStyle/>
+            <a:p>
+              <a:pPr algn="ctr"/>
+              <a:r>
+                <a:rPr lang="en-US" dirty="0" err="1" smtClean="0">
+                  <a:solidFill>
+                    <a:schemeClr val="tx1"/>
+                  </a:solidFill>
+                </a:rPr>
+                <a:t>Fermée</a:t>
+              </a:r>
+              <a:endParaRPr lang="en-US" dirty="0">
+                <a:solidFill>
+                  <a:schemeClr val="tx1"/>
+                </a:solidFill>
+              </a:endParaRPr>
+            </a:p>
+          </p:txBody>
+        </p:sp>
+        <p:cxnSp>
+          <p:nvCxnSpPr>
+            <p:cNvPr id="40" name="Connecteur droit avec flèche 39"/>
+            <p:cNvCxnSpPr>
+              <a:stCxn id="35" idx="5"/>
+              <a:endCxn id="37" idx="0"/>
+            </p:cNvCxnSpPr>
+            <p:nvPr/>
+          </p:nvCxnSpPr>
+          <p:spPr>
+            <a:xfrm>
+              <a:off x="2846257" y="723418"/>
+              <a:ext cx="686157" cy="268730"/>
+            </a:xfrm>
+            <a:prstGeom prst="straightConnector1">
+              <a:avLst/>
+            </a:prstGeom>
+            <a:ln>
+              <a:solidFill>
+                <a:schemeClr val="tx1"/>
+              </a:solidFill>
+              <a:tailEnd type="triangle" w="lg" len="lg"/>
+            </a:ln>
+          </p:spPr>
+          <p:style>
+            <a:lnRef idx="1">
+              <a:schemeClr val="accent1"/>
+            </a:lnRef>
+            <a:fillRef idx="0">
+              <a:schemeClr val="accent1"/>
+            </a:fillRef>
+            <a:effectRef idx="0">
+              <a:schemeClr val="accent1"/>
+            </a:effectRef>
+            <a:fontRef idx="minor">
+              <a:schemeClr val="tx1"/>
+            </a:fontRef>
+          </p:style>
+        </p:cxnSp>
+        <p:cxnSp>
+          <p:nvCxnSpPr>
+            <p:cNvPr id="42" name="Connecteur droit avec flèche 41"/>
+            <p:cNvCxnSpPr>
+              <a:stCxn id="36" idx="3"/>
+              <a:endCxn id="38" idx="0"/>
+            </p:cNvCxnSpPr>
+            <p:nvPr/>
+          </p:nvCxnSpPr>
+          <p:spPr>
+            <a:xfrm flipH="1">
+              <a:off x="10085614" y="723418"/>
+              <a:ext cx="577245" cy="215849"/>
+            </a:xfrm>
+            <a:prstGeom prst="straightConnector1">
+              <a:avLst/>
+            </a:prstGeom>
+            <a:ln>
+              <a:solidFill>
+                <a:schemeClr val="tx1"/>
+              </a:solidFill>
+              <a:tailEnd type="triangle" w="lg" len="lg"/>
+            </a:ln>
+          </p:spPr>
+          <p:style>
+            <a:lnRef idx="1">
+              <a:schemeClr val="accent1"/>
+            </a:lnRef>
+            <a:fillRef idx="0">
+              <a:schemeClr val="accent1"/>
+            </a:fillRef>
+            <a:effectRef idx="0">
+              <a:schemeClr val="accent1"/>
+            </a:effectRef>
+            <a:fontRef idx="minor">
+              <a:schemeClr val="tx1"/>
+            </a:fontRef>
+          </p:style>
+        </p:cxnSp>
+        <p:sp>
+          <p:nvSpPr>
+            <p:cNvPr id="43" name="ZoneTexte 42"/>
+            <p:cNvSpPr txBox="1"/>
+            <p:nvPr/>
+          </p:nvSpPr>
+          <p:spPr>
+            <a:xfrm>
+              <a:off x="3038950" y="585707"/>
+              <a:ext cx="595676" cy="276999"/>
+            </a:xfrm>
+            <a:prstGeom prst="rect">
+              <a:avLst/>
+            </a:prstGeom>
+            <a:noFill/>
+          </p:spPr>
+          <p:txBody>
+            <a:bodyPr wrap="none" rtlCol="0">
+              <a:spAutoFit/>
+            </a:bodyPr>
+            <a:lstStyle/>
+            <a:p>
+              <a:r>
+                <a:rPr lang="en-US" sz="1200" dirty="0" smtClean="0"/>
+                <a:t>Socket</a:t>
+              </a:r>
+              <a:endParaRPr lang="en-US" sz="1200" dirty="0"/>
+            </a:p>
+          </p:txBody>
+        </p:sp>
+        <p:sp>
+          <p:nvSpPr>
+            <p:cNvPr id="44" name="ZoneTexte 43"/>
+            <p:cNvSpPr txBox="1"/>
+            <p:nvPr/>
+          </p:nvSpPr>
+          <p:spPr>
+            <a:xfrm>
+              <a:off x="9890274" y="584918"/>
+              <a:ext cx="595676" cy="276999"/>
+            </a:xfrm>
+            <a:prstGeom prst="rect">
+              <a:avLst/>
+            </a:prstGeom>
+            <a:noFill/>
+          </p:spPr>
+          <p:txBody>
+            <a:bodyPr wrap="none" rtlCol="0">
+              <a:spAutoFit/>
+            </a:bodyPr>
+            <a:lstStyle/>
+            <a:p>
+              <a:r>
+                <a:rPr lang="en-US" sz="1200" dirty="0" smtClean="0"/>
+                <a:t>Socket</a:t>
+              </a:r>
+              <a:endParaRPr lang="en-US" sz="1200" dirty="0"/>
+            </a:p>
+          </p:txBody>
+        </p:sp>
+        <p:sp>
+          <p:nvSpPr>
+            <p:cNvPr id="46" name="Ellipse 45"/>
+            <p:cNvSpPr/>
+            <p:nvPr/>
+          </p:nvSpPr>
+          <p:spPr>
+            <a:xfrm>
+              <a:off x="3859660" y="1843615"/>
+              <a:ext cx="1600200" cy="783771"/>
+            </a:xfrm>
+            <a:prstGeom prst="ellipse">
+              <a:avLst/>
+            </a:prstGeom>
+            <a:noFill/>
+            <a:ln>
+              <a:solidFill>
+                <a:schemeClr val="tx1"/>
+              </a:solidFill>
+            </a:ln>
+          </p:spPr>
+          <p:style>
+            <a:lnRef idx="2">
+              <a:schemeClr val="accent1">
+                <a:shade val="50000"/>
+              </a:schemeClr>
+            </a:lnRef>
+            <a:fillRef idx="1">
+              <a:schemeClr val="accent1"/>
+            </a:fillRef>
+            <a:effectRef idx="0">
+              <a:schemeClr val="accent1"/>
+            </a:effectRef>
+            <a:fontRef idx="minor">
+              <a:schemeClr val="lt1"/>
+            </a:fontRef>
+          </p:style>
+          <p:txBody>
+            <a:bodyPr lIns="0" tIns="0" rIns="0" bIns="0" rtlCol="0" anchor="ctr"/>
+            <a:lstStyle/>
+            <a:p>
+              <a:pPr algn="ctr"/>
+              <a:r>
+                <a:rPr lang="en-US" dirty="0" err="1" smtClean="0">
+                  <a:solidFill>
+                    <a:schemeClr val="tx1"/>
+                  </a:solidFill>
+                </a:rPr>
+                <a:t>Attente</a:t>
+              </a:r>
+              <a:r>
+                <a:rPr lang="en-US" dirty="0" smtClean="0">
+                  <a:solidFill>
+                    <a:schemeClr val="tx1"/>
+                  </a:solidFill>
+                </a:rPr>
+                <a:t> SYN</a:t>
+              </a:r>
+              <a:endParaRPr lang="en-US" dirty="0">
+                <a:solidFill>
+                  <a:schemeClr val="tx1"/>
+                </a:solidFill>
+              </a:endParaRPr>
+            </a:p>
+          </p:txBody>
+        </p:sp>
+        <p:sp>
+          <p:nvSpPr>
+            <p:cNvPr id="47" name="Ellipse 46"/>
+            <p:cNvSpPr/>
+            <p:nvPr/>
+          </p:nvSpPr>
+          <p:spPr>
+            <a:xfrm>
+              <a:off x="6825716" y="2148780"/>
+              <a:ext cx="1600200" cy="783771"/>
+            </a:xfrm>
+            <a:prstGeom prst="ellipse">
+              <a:avLst/>
+            </a:prstGeom>
+            <a:noFill/>
+            <a:ln>
+              <a:solidFill>
+                <a:schemeClr val="tx1"/>
+              </a:solidFill>
+            </a:ln>
+          </p:spPr>
+          <p:style>
+            <a:lnRef idx="2">
+              <a:schemeClr val="accent1">
+                <a:shade val="50000"/>
+              </a:schemeClr>
+            </a:lnRef>
+            <a:fillRef idx="1">
+              <a:schemeClr val="accent1"/>
+            </a:fillRef>
+            <a:effectRef idx="0">
+              <a:schemeClr val="accent1"/>
+            </a:effectRef>
+            <a:fontRef idx="minor">
+              <a:schemeClr val="lt1"/>
+            </a:fontRef>
+          </p:style>
+          <p:txBody>
+            <a:bodyPr lIns="0" tIns="0" rIns="0" bIns="0" rtlCol="0" anchor="ctr"/>
+            <a:lstStyle/>
+            <a:p>
+              <a:pPr algn="ctr"/>
+              <a:r>
+                <a:rPr lang="en-US" dirty="0" err="1" smtClean="0">
+                  <a:solidFill>
+                    <a:schemeClr val="tx1"/>
+                  </a:solidFill>
+                </a:rPr>
+                <a:t>Attente</a:t>
+              </a:r>
+              <a:r>
+                <a:rPr lang="en-US" dirty="0" smtClean="0">
+                  <a:solidFill>
+                    <a:schemeClr val="tx1"/>
+                  </a:solidFill>
+                </a:rPr>
+                <a:t> ACK</a:t>
+              </a:r>
+              <a:endParaRPr lang="en-US" dirty="0">
+                <a:solidFill>
+                  <a:schemeClr val="tx1"/>
+                </a:solidFill>
+              </a:endParaRPr>
+            </a:p>
+          </p:txBody>
+        </p:sp>
+        <p:cxnSp>
+          <p:nvCxnSpPr>
+            <p:cNvPr id="49" name="Connecteur droit avec flèche 48"/>
+            <p:cNvCxnSpPr>
+              <a:stCxn id="37" idx="5"/>
+              <a:endCxn id="46" idx="0"/>
+            </p:cNvCxnSpPr>
+            <p:nvPr/>
+          </p:nvCxnSpPr>
+          <p:spPr>
+            <a:xfrm>
+              <a:off x="4098170" y="1661138"/>
+              <a:ext cx="561590" cy="182477"/>
+            </a:xfrm>
+            <a:prstGeom prst="straightConnector1">
+              <a:avLst/>
+            </a:prstGeom>
+            <a:ln>
+              <a:solidFill>
+                <a:schemeClr val="tx1"/>
+              </a:solidFill>
+              <a:tailEnd type="triangle" w="lg" len="lg"/>
+            </a:ln>
+          </p:spPr>
+          <p:style>
+            <a:lnRef idx="1">
+              <a:schemeClr val="accent1"/>
+            </a:lnRef>
+            <a:fillRef idx="0">
+              <a:schemeClr val="accent1"/>
+            </a:fillRef>
+            <a:effectRef idx="0">
+              <a:schemeClr val="accent1"/>
+            </a:effectRef>
+            <a:fontRef idx="minor">
+              <a:schemeClr val="tx1"/>
+            </a:fontRef>
+          </p:style>
+        </p:cxnSp>
+        <p:sp>
+          <p:nvSpPr>
+            <p:cNvPr id="52" name="ZoneTexte 51"/>
+            <p:cNvSpPr txBox="1"/>
+            <p:nvPr/>
+          </p:nvSpPr>
+          <p:spPr>
+            <a:xfrm>
+              <a:off x="4247069" y="1532768"/>
+              <a:ext cx="1005532" cy="276999"/>
+            </a:xfrm>
+            <a:prstGeom prst="rect">
+              <a:avLst/>
+            </a:prstGeom>
+            <a:noFill/>
+          </p:spPr>
+          <p:txBody>
+            <a:bodyPr wrap="none" rtlCol="0">
+              <a:spAutoFit/>
+            </a:bodyPr>
+            <a:lstStyle/>
+            <a:p>
+              <a:r>
+                <a:rPr lang="en-US" sz="1200" dirty="0" smtClean="0"/>
+                <a:t>Connect/SYN</a:t>
+              </a:r>
+              <a:endParaRPr lang="en-US" sz="1200" dirty="0"/>
+            </a:p>
+          </p:txBody>
+        </p:sp>
+        <p:sp>
+          <p:nvSpPr>
+            <p:cNvPr id="53" name="ZoneTexte 52"/>
+            <p:cNvSpPr txBox="1"/>
+            <p:nvPr/>
+          </p:nvSpPr>
+          <p:spPr>
+            <a:xfrm>
+              <a:off x="8789352" y="1491669"/>
+              <a:ext cx="655757" cy="276999"/>
+            </a:xfrm>
+            <a:prstGeom prst="rect">
+              <a:avLst/>
+            </a:prstGeom>
+            <a:noFill/>
+          </p:spPr>
+          <p:txBody>
+            <a:bodyPr wrap="none" rtlCol="0">
+              <a:spAutoFit/>
+            </a:bodyPr>
+            <a:lstStyle/>
+            <a:p>
+              <a:r>
+                <a:rPr lang="en-US" sz="1200" dirty="0" smtClean="0"/>
+                <a:t>Listen/-</a:t>
+              </a:r>
+              <a:endParaRPr lang="en-US" sz="1200" dirty="0"/>
+            </a:p>
+          </p:txBody>
+        </p:sp>
+        <p:sp>
+          <p:nvSpPr>
+            <p:cNvPr id="56" name="Ellipse 55"/>
+            <p:cNvSpPr/>
+            <p:nvPr/>
+          </p:nvSpPr>
+          <p:spPr>
+            <a:xfrm>
+              <a:off x="5459860" y="2865947"/>
+              <a:ext cx="1600200" cy="783771"/>
+            </a:xfrm>
+            <a:prstGeom prst="ellipse">
+              <a:avLst/>
+            </a:prstGeom>
+            <a:noFill/>
+            <a:ln>
+              <a:solidFill>
+                <a:schemeClr val="tx1"/>
+              </a:solidFill>
+            </a:ln>
+          </p:spPr>
+          <p:style>
+            <a:lnRef idx="2">
+              <a:schemeClr val="accent1">
+                <a:shade val="50000"/>
+              </a:schemeClr>
+            </a:lnRef>
+            <a:fillRef idx="1">
+              <a:schemeClr val="accent1"/>
+            </a:fillRef>
+            <a:effectRef idx="0">
+              <a:schemeClr val="accent1"/>
+            </a:effectRef>
+            <a:fontRef idx="minor">
+              <a:schemeClr val="lt1"/>
+            </a:fontRef>
+          </p:style>
+          <p:txBody>
+            <a:bodyPr lIns="0" tIns="0" rIns="0" bIns="0" rtlCol="0" anchor="ctr"/>
+            <a:lstStyle/>
+            <a:p>
+              <a:pPr algn="ctr"/>
+              <a:r>
+                <a:rPr lang="en-US" dirty="0" err="1" smtClean="0">
+                  <a:solidFill>
+                    <a:schemeClr val="tx1"/>
+                  </a:solidFill>
+                </a:rPr>
+                <a:t>Connexion</a:t>
+              </a:r>
+              <a:r>
+                <a:rPr lang="en-US" dirty="0" smtClean="0">
+                  <a:solidFill>
+                    <a:schemeClr val="tx1"/>
+                  </a:solidFill>
+                </a:rPr>
+                <a:t> </a:t>
+              </a:r>
+              <a:r>
+                <a:rPr lang="en-US" dirty="0" err="1" smtClean="0">
+                  <a:solidFill>
+                    <a:schemeClr val="tx1"/>
+                  </a:solidFill>
+                </a:rPr>
+                <a:t>établie</a:t>
+              </a:r>
+              <a:endParaRPr lang="en-US" dirty="0">
+                <a:solidFill>
+                  <a:schemeClr val="tx1"/>
+                </a:solidFill>
+              </a:endParaRPr>
+            </a:p>
+          </p:txBody>
+        </p:sp>
+        <p:cxnSp>
+          <p:nvCxnSpPr>
+            <p:cNvPr id="58" name="Connecteur droit avec flèche 57"/>
+            <p:cNvCxnSpPr>
+              <a:stCxn id="46" idx="5"/>
+              <a:endCxn id="56" idx="0"/>
+            </p:cNvCxnSpPr>
+            <p:nvPr/>
+          </p:nvCxnSpPr>
+          <p:spPr>
+            <a:xfrm>
+              <a:off x="5225516" y="2512605"/>
+              <a:ext cx="1034444" cy="353342"/>
+            </a:xfrm>
+            <a:prstGeom prst="straightConnector1">
+              <a:avLst/>
+            </a:prstGeom>
+            <a:ln>
+              <a:solidFill>
+                <a:schemeClr val="tx1"/>
+              </a:solidFill>
+              <a:tailEnd type="triangle" w="lg" len="lg"/>
+            </a:ln>
+          </p:spPr>
+          <p:style>
+            <a:lnRef idx="1">
+              <a:schemeClr val="accent1"/>
+            </a:lnRef>
+            <a:fillRef idx="0">
+              <a:schemeClr val="accent1"/>
+            </a:fillRef>
+            <a:effectRef idx="0">
+              <a:schemeClr val="accent1"/>
+            </a:effectRef>
+            <a:fontRef idx="minor">
+              <a:schemeClr val="tx1"/>
+            </a:fontRef>
+          </p:style>
+        </p:cxnSp>
+        <p:cxnSp>
+          <p:nvCxnSpPr>
+            <p:cNvPr id="60" name="Connecteur droit avec flèche 59"/>
+            <p:cNvCxnSpPr>
+              <a:stCxn id="47" idx="3"/>
+              <a:endCxn id="56" idx="0"/>
+            </p:cNvCxnSpPr>
+            <p:nvPr/>
+          </p:nvCxnSpPr>
+          <p:spPr>
+            <a:xfrm flipH="1">
+              <a:off x="6259960" y="2817770"/>
+              <a:ext cx="800100" cy="48177"/>
+            </a:xfrm>
+            <a:prstGeom prst="straightConnector1">
+              <a:avLst/>
+            </a:prstGeom>
+            <a:ln>
+              <a:solidFill>
+                <a:schemeClr val="tx1"/>
+              </a:solidFill>
+              <a:tailEnd type="triangle" w="lg" len="lg"/>
+            </a:ln>
+          </p:spPr>
+          <p:style>
+            <a:lnRef idx="1">
+              <a:schemeClr val="accent1"/>
+            </a:lnRef>
+            <a:fillRef idx="0">
+              <a:schemeClr val="accent1"/>
+            </a:fillRef>
+            <a:effectRef idx="0">
+              <a:schemeClr val="accent1"/>
+            </a:effectRef>
+            <a:fontRef idx="minor">
+              <a:schemeClr val="tx1"/>
+            </a:fontRef>
+          </p:style>
+        </p:cxnSp>
+        <p:sp>
+          <p:nvSpPr>
+            <p:cNvPr id="64" name="ZoneTexte 63"/>
+            <p:cNvSpPr txBox="1"/>
+            <p:nvPr/>
+          </p:nvSpPr>
+          <p:spPr>
+            <a:xfrm>
+              <a:off x="5297257" y="2363386"/>
+              <a:ext cx="1021818" cy="276999"/>
+            </a:xfrm>
+            <a:prstGeom prst="rect">
+              <a:avLst/>
+            </a:prstGeom>
+            <a:noFill/>
+          </p:spPr>
+          <p:txBody>
+            <a:bodyPr wrap="none" rtlCol="0">
+              <a:spAutoFit/>
+            </a:bodyPr>
+            <a:lstStyle/>
+            <a:p>
+              <a:r>
+                <a:rPr lang="en-US" sz="1200" dirty="0" smtClean="0"/>
+                <a:t>SYN,ACK/SYN</a:t>
+              </a:r>
+              <a:endParaRPr lang="en-US" sz="1200" dirty="0"/>
+            </a:p>
+          </p:txBody>
+        </p:sp>
+        <p:sp>
+          <p:nvSpPr>
+            <p:cNvPr id="65" name="ZoneTexte 64"/>
+            <p:cNvSpPr txBox="1"/>
+            <p:nvPr/>
+          </p:nvSpPr>
+          <p:spPr>
+            <a:xfrm>
+              <a:off x="6342997" y="2564859"/>
+              <a:ext cx="540982" cy="276999"/>
+            </a:xfrm>
+            <a:prstGeom prst="rect">
+              <a:avLst/>
+            </a:prstGeom>
+            <a:noFill/>
+          </p:spPr>
+          <p:txBody>
+            <a:bodyPr wrap="none" rtlCol="0">
+              <a:spAutoFit/>
+            </a:bodyPr>
+            <a:lstStyle/>
+            <a:p>
+              <a:r>
+                <a:rPr lang="en-US" sz="1200" dirty="0" smtClean="0"/>
+                <a:t>ACK/-</a:t>
+              </a:r>
+              <a:endParaRPr lang="en-US" sz="1200" dirty="0"/>
+            </a:p>
+          </p:txBody>
+        </p:sp>
+        <p:sp>
+          <p:nvSpPr>
+            <p:cNvPr id="68" name="Ellipse 67"/>
+            <p:cNvSpPr/>
+            <p:nvPr/>
+          </p:nvSpPr>
+          <p:spPr>
+            <a:xfrm>
+              <a:off x="3784143" y="3859857"/>
+              <a:ext cx="1600200" cy="783771"/>
+            </a:xfrm>
+            <a:prstGeom prst="ellipse">
+              <a:avLst/>
+            </a:prstGeom>
+            <a:noFill/>
+            <a:ln>
+              <a:solidFill>
+                <a:schemeClr val="tx1"/>
+              </a:solidFill>
+            </a:ln>
+          </p:spPr>
+          <p:style>
+            <a:lnRef idx="2">
+              <a:schemeClr val="accent1">
+                <a:shade val="50000"/>
+              </a:schemeClr>
+            </a:lnRef>
+            <a:fillRef idx="1">
+              <a:schemeClr val="accent1"/>
+            </a:fillRef>
+            <a:effectRef idx="0">
+              <a:schemeClr val="accent1"/>
+            </a:effectRef>
+            <a:fontRef idx="minor">
+              <a:schemeClr val="lt1"/>
+            </a:fontRef>
+          </p:style>
+          <p:txBody>
+            <a:bodyPr lIns="0" tIns="0" rIns="0" bIns="0" rtlCol="0" anchor="ctr"/>
+            <a:lstStyle/>
+            <a:p>
+              <a:pPr algn="ctr"/>
+              <a:r>
+                <a:rPr lang="en-US" dirty="0" err="1" smtClean="0">
+                  <a:solidFill>
+                    <a:schemeClr val="tx1"/>
+                  </a:solidFill>
+                </a:rPr>
+                <a:t>Attente</a:t>
+              </a:r>
+              <a:endParaRPr lang="en-US" dirty="0" smtClean="0">
+                <a:solidFill>
+                  <a:schemeClr val="tx1"/>
+                </a:solidFill>
+              </a:endParaRPr>
+            </a:p>
+            <a:p>
+              <a:pPr algn="ctr"/>
+              <a:r>
+                <a:rPr lang="en-US" dirty="0" smtClean="0">
+                  <a:solidFill>
+                    <a:schemeClr val="tx1"/>
+                  </a:solidFill>
+                </a:rPr>
+                <a:t>ACK</a:t>
+              </a:r>
+              <a:endParaRPr lang="en-US" dirty="0">
+                <a:solidFill>
+                  <a:schemeClr val="tx1"/>
+                </a:solidFill>
+              </a:endParaRPr>
+            </a:p>
+          </p:txBody>
+        </p:sp>
+        <p:sp>
+          <p:nvSpPr>
+            <p:cNvPr id="69" name="Ellipse 68"/>
+            <p:cNvSpPr/>
+            <p:nvPr/>
+          </p:nvSpPr>
+          <p:spPr>
+            <a:xfrm>
+              <a:off x="7101621" y="3859857"/>
+              <a:ext cx="1600200" cy="783771"/>
+            </a:xfrm>
+            <a:prstGeom prst="ellipse">
+              <a:avLst/>
+            </a:prstGeom>
+            <a:noFill/>
+            <a:ln>
+              <a:solidFill>
+                <a:schemeClr val="tx1"/>
+              </a:solidFill>
+            </a:ln>
+          </p:spPr>
+          <p:style>
+            <a:lnRef idx="2">
+              <a:schemeClr val="accent1">
+                <a:shade val="50000"/>
+              </a:schemeClr>
+            </a:lnRef>
+            <a:fillRef idx="1">
+              <a:schemeClr val="accent1"/>
+            </a:fillRef>
+            <a:effectRef idx="0">
+              <a:schemeClr val="accent1"/>
+            </a:effectRef>
+            <a:fontRef idx="minor">
+              <a:schemeClr val="lt1"/>
+            </a:fontRef>
+          </p:style>
+          <p:txBody>
+            <a:bodyPr lIns="0" tIns="0" rIns="0" bIns="0" rtlCol="0" anchor="ctr"/>
+            <a:lstStyle/>
+            <a:p>
+              <a:pPr algn="ctr"/>
+              <a:r>
+                <a:rPr lang="en-US" dirty="0" err="1" smtClean="0">
+                  <a:solidFill>
+                    <a:schemeClr val="tx1"/>
+                  </a:solidFill>
+                </a:rPr>
+                <a:t>Attente</a:t>
+              </a:r>
+              <a:r>
+                <a:rPr lang="en-US" dirty="0" smtClean="0">
+                  <a:solidFill>
+                    <a:schemeClr val="tx1"/>
+                  </a:solidFill>
+                </a:rPr>
+                <a:t> close</a:t>
+              </a:r>
+              <a:endParaRPr lang="en-US" dirty="0">
+                <a:solidFill>
+                  <a:schemeClr val="tx1"/>
+                </a:solidFill>
+              </a:endParaRPr>
+            </a:p>
+          </p:txBody>
+        </p:sp>
+        <p:sp>
+          <p:nvSpPr>
+            <p:cNvPr id="70" name="Ellipse 69"/>
+            <p:cNvSpPr/>
+            <p:nvPr/>
+          </p:nvSpPr>
+          <p:spPr>
+            <a:xfrm>
+              <a:off x="5355796" y="5971685"/>
+              <a:ext cx="1600200" cy="783771"/>
+            </a:xfrm>
+            <a:prstGeom prst="ellipse">
+              <a:avLst/>
+            </a:prstGeom>
+            <a:noFill/>
+            <a:ln>
+              <a:solidFill>
+                <a:schemeClr val="tx1"/>
+              </a:solidFill>
+            </a:ln>
+          </p:spPr>
+          <p:style>
+            <a:lnRef idx="2">
+              <a:schemeClr val="accent1">
+                <a:shade val="50000"/>
+              </a:schemeClr>
+            </a:lnRef>
+            <a:fillRef idx="1">
+              <a:schemeClr val="accent1"/>
+            </a:fillRef>
+            <a:effectRef idx="0">
+              <a:schemeClr val="accent1"/>
+            </a:effectRef>
+            <a:fontRef idx="minor">
+              <a:schemeClr val="lt1"/>
+            </a:fontRef>
+          </p:style>
+          <p:txBody>
+            <a:bodyPr lIns="0" tIns="0" rIns="0" bIns="0" rtlCol="0" anchor="ctr"/>
+            <a:lstStyle/>
+            <a:p>
+              <a:pPr algn="ctr"/>
+              <a:r>
+                <a:rPr lang="en-US" dirty="0" err="1" smtClean="0">
+                  <a:solidFill>
+                    <a:schemeClr val="tx1"/>
+                  </a:solidFill>
+                </a:rPr>
+                <a:t>Fermée</a:t>
+              </a:r>
+              <a:endParaRPr lang="en-US" dirty="0">
+                <a:solidFill>
+                  <a:schemeClr val="tx1"/>
+                </a:solidFill>
+              </a:endParaRPr>
+            </a:p>
+          </p:txBody>
+        </p:sp>
+        <p:cxnSp>
+          <p:nvCxnSpPr>
+            <p:cNvPr id="72" name="Connecteur droit avec flèche 71"/>
+            <p:cNvCxnSpPr>
+              <a:stCxn id="56" idx="3"/>
+              <a:endCxn id="68" idx="0"/>
+            </p:cNvCxnSpPr>
+            <p:nvPr/>
+          </p:nvCxnSpPr>
+          <p:spPr>
+            <a:xfrm flipH="1">
+              <a:off x="4584243" y="3534937"/>
+              <a:ext cx="1109961" cy="324920"/>
+            </a:xfrm>
+            <a:prstGeom prst="straightConnector1">
+              <a:avLst/>
+            </a:prstGeom>
+            <a:ln>
+              <a:solidFill>
+                <a:schemeClr val="tx1"/>
+              </a:solidFill>
+              <a:tailEnd type="triangle" w="lg" len="lg"/>
+            </a:ln>
+          </p:spPr>
+          <p:style>
+            <a:lnRef idx="1">
+              <a:schemeClr val="accent1"/>
+            </a:lnRef>
+            <a:fillRef idx="0">
+              <a:schemeClr val="accent1"/>
+            </a:fillRef>
+            <a:effectRef idx="0">
+              <a:schemeClr val="accent1"/>
+            </a:effectRef>
+            <a:fontRef idx="minor">
+              <a:schemeClr val="tx1"/>
+            </a:fontRef>
+          </p:style>
+        </p:cxnSp>
+        <p:cxnSp>
+          <p:nvCxnSpPr>
+            <p:cNvPr id="74" name="Connecteur droit avec flèche 73"/>
+            <p:cNvCxnSpPr>
+              <a:stCxn id="56" idx="5"/>
+              <a:endCxn id="69" idx="0"/>
+            </p:cNvCxnSpPr>
+            <p:nvPr/>
+          </p:nvCxnSpPr>
+          <p:spPr>
+            <a:xfrm>
+              <a:off x="6825716" y="3534937"/>
+              <a:ext cx="1076005" cy="324920"/>
+            </a:xfrm>
+            <a:prstGeom prst="straightConnector1">
+              <a:avLst/>
+            </a:prstGeom>
+            <a:ln>
+              <a:solidFill>
+                <a:schemeClr val="tx1"/>
+              </a:solidFill>
+              <a:tailEnd type="triangle" w="lg" len="lg"/>
+            </a:ln>
+          </p:spPr>
+          <p:style>
+            <a:lnRef idx="1">
+              <a:schemeClr val="accent1"/>
+            </a:lnRef>
+            <a:fillRef idx="0">
+              <a:schemeClr val="accent1"/>
+            </a:fillRef>
+            <a:effectRef idx="0">
+              <a:schemeClr val="accent1"/>
+            </a:effectRef>
+            <a:fontRef idx="minor">
+              <a:schemeClr val="tx1"/>
+            </a:fontRef>
+          </p:style>
+        </p:cxnSp>
+        <p:cxnSp>
+          <p:nvCxnSpPr>
+            <p:cNvPr id="76" name="Connecteur droit avec flèche 75"/>
+            <p:cNvCxnSpPr>
+              <a:stCxn id="69" idx="3"/>
+              <a:endCxn id="115" idx="0"/>
+            </p:cNvCxnSpPr>
+            <p:nvPr/>
+          </p:nvCxnSpPr>
+          <p:spPr>
+            <a:xfrm flipH="1">
+              <a:off x="6155896" y="4528847"/>
+              <a:ext cx="1180069" cy="296560"/>
+            </a:xfrm>
+            <a:prstGeom prst="straightConnector1">
+              <a:avLst/>
+            </a:prstGeom>
+            <a:ln>
+              <a:solidFill>
+                <a:schemeClr val="tx1"/>
+              </a:solidFill>
+              <a:tailEnd type="triangle" w="lg" len="lg"/>
+            </a:ln>
+          </p:spPr>
+          <p:style>
+            <a:lnRef idx="1">
+              <a:schemeClr val="accent1"/>
+            </a:lnRef>
+            <a:fillRef idx="0">
+              <a:schemeClr val="accent1"/>
+            </a:fillRef>
+            <a:effectRef idx="0">
+              <a:schemeClr val="accent1"/>
+            </a:effectRef>
+            <a:fontRef idx="minor">
+              <a:schemeClr val="tx1"/>
+            </a:fontRef>
+          </p:style>
+        </p:cxnSp>
+        <p:cxnSp>
+          <p:nvCxnSpPr>
+            <p:cNvPr id="78" name="Connecteur droit avec flèche 77"/>
+            <p:cNvCxnSpPr>
+              <a:stCxn id="68" idx="5"/>
+              <a:endCxn id="115" idx="0"/>
+            </p:cNvCxnSpPr>
+            <p:nvPr/>
+          </p:nvCxnSpPr>
+          <p:spPr>
+            <a:xfrm>
+              <a:off x="5149999" y="4528847"/>
+              <a:ext cx="1005897" cy="296560"/>
+            </a:xfrm>
+            <a:prstGeom prst="straightConnector1">
+              <a:avLst/>
+            </a:prstGeom>
+            <a:ln>
+              <a:solidFill>
+                <a:schemeClr val="tx1"/>
+              </a:solidFill>
+              <a:tailEnd type="triangle" w="lg" len="lg"/>
+            </a:ln>
+          </p:spPr>
+          <p:style>
+            <a:lnRef idx="1">
+              <a:schemeClr val="accent1"/>
+            </a:lnRef>
+            <a:fillRef idx="0">
+              <a:schemeClr val="accent1"/>
+            </a:fillRef>
+            <a:effectRef idx="0">
+              <a:schemeClr val="accent1"/>
+            </a:effectRef>
+            <a:fontRef idx="minor">
+              <a:schemeClr val="tx1"/>
+            </a:fontRef>
+          </p:style>
+        </p:cxnSp>
+        <p:sp>
+          <p:nvSpPr>
+            <p:cNvPr id="80" name="ZoneTexte 79"/>
+            <p:cNvSpPr txBox="1"/>
+            <p:nvPr/>
+          </p:nvSpPr>
+          <p:spPr>
+            <a:xfrm>
+              <a:off x="5139549" y="3618303"/>
+              <a:ext cx="788999" cy="276999"/>
+            </a:xfrm>
+            <a:prstGeom prst="rect">
+              <a:avLst/>
+            </a:prstGeom>
+            <a:noFill/>
+          </p:spPr>
+          <p:txBody>
+            <a:bodyPr wrap="none" rtlCol="0">
+              <a:spAutoFit/>
+            </a:bodyPr>
+            <a:lstStyle/>
+            <a:p>
+              <a:r>
+                <a:rPr lang="en-US" sz="1200" dirty="0" smtClean="0"/>
+                <a:t>Close/FIN</a:t>
+              </a:r>
+              <a:endParaRPr lang="en-US" sz="1200" dirty="0"/>
+            </a:p>
+          </p:txBody>
+        </p:sp>
+        <p:sp>
+          <p:nvSpPr>
+            <p:cNvPr id="81" name="ZoneTexte 80"/>
+            <p:cNvSpPr txBox="1"/>
+            <p:nvPr/>
+          </p:nvSpPr>
+          <p:spPr>
+            <a:xfrm>
+              <a:off x="6327443" y="4374630"/>
+              <a:ext cx="788999" cy="276999"/>
+            </a:xfrm>
+            <a:prstGeom prst="rect">
+              <a:avLst/>
+            </a:prstGeom>
+            <a:noFill/>
+          </p:spPr>
+          <p:txBody>
+            <a:bodyPr wrap="none" rtlCol="0">
+              <a:spAutoFit/>
+            </a:bodyPr>
+            <a:lstStyle/>
+            <a:p>
+              <a:r>
+                <a:rPr lang="en-US" sz="1200" dirty="0" smtClean="0"/>
+                <a:t>Close/FIN</a:t>
+              </a:r>
+              <a:endParaRPr lang="en-US" sz="1200" dirty="0"/>
+            </a:p>
+          </p:txBody>
+        </p:sp>
+        <p:sp>
+          <p:nvSpPr>
+            <p:cNvPr id="82" name="ZoneTexte 81"/>
+            <p:cNvSpPr txBox="1"/>
+            <p:nvPr/>
+          </p:nvSpPr>
+          <p:spPr>
+            <a:xfrm>
+              <a:off x="6551316" y="3623091"/>
+              <a:ext cx="697563" cy="276999"/>
+            </a:xfrm>
+            <a:prstGeom prst="rect">
+              <a:avLst/>
+            </a:prstGeom>
+            <a:noFill/>
+          </p:spPr>
+          <p:txBody>
+            <a:bodyPr wrap="none" rtlCol="0">
+              <a:spAutoFit/>
+            </a:bodyPr>
+            <a:lstStyle/>
+            <a:p>
+              <a:r>
+                <a:rPr lang="en-US" sz="1200" dirty="0" smtClean="0"/>
+                <a:t>FIN/ACK</a:t>
+              </a:r>
+              <a:endParaRPr lang="en-US" sz="1200" dirty="0"/>
+            </a:p>
+          </p:txBody>
+        </p:sp>
+        <p:sp>
+          <p:nvSpPr>
+            <p:cNvPr id="83" name="ZoneTexte 82"/>
+            <p:cNvSpPr txBox="1"/>
+            <p:nvPr/>
+          </p:nvSpPr>
+          <p:spPr>
+            <a:xfrm>
+              <a:off x="5321546" y="4366665"/>
+              <a:ext cx="697563" cy="276999"/>
+            </a:xfrm>
+            <a:prstGeom prst="rect">
+              <a:avLst/>
+            </a:prstGeom>
+            <a:noFill/>
+          </p:spPr>
+          <p:txBody>
+            <a:bodyPr wrap="none" rtlCol="0">
+              <a:spAutoFit/>
+            </a:bodyPr>
+            <a:lstStyle/>
+            <a:p>
+              <a:r>
+                <a:rPr lang="en-US" sz="1200" dirty="0" smtClean="0"/>
+                <a:t>FIN/ACK</a:t>
+              </a:r>
+              <a:endParaRPr lang="en-US" sz="1200" dirty="0"/>
+            </a:p>
+          </p:txBody>
+        </p:sp>
+        <p:sp>
+          <p:nvSpPr>
+            <p:cNvPr id="115" name="Ellipse 114"/>
+            <p:cNvSpPr/>
+            <p:nvPr/>
+          </p:nvSpPr>
+          <p:spPr>
+            <a:xfrm>
+              <a:off x="5355796" y="4825407"/>
+              <a:ext cx="1600200" cy="783771"/>
+            </a:xfrm>
+            <a:prstGeom prst="ellipse">
+              <a:avLst/>
+            </a:prstGeom>
+            <a:noFill/>
+            <a:ln>
+              <a:solidFill>
+                <a:schemeClr val="tx1"/>
+              </a:solidFill>
+            </a:ln>
+          </p:spPr>
+          <p:style>
+            <a:lnRef idx="2">
+              <a:schemeClr val="accent1">
+                <a:shade val="50000"/>
+              </a:schemeClr>
+            </a:lnRef>
+            <a:fillRef idx="1">
+              <a:schemeClr val="accent1"/>
+            </a:fillRef>
+            <a:effectRef idx="0">
+              <a:schemeClr val="accent1"/>
+            </a:effectRef>
+            <a:fontRef idx="minor">
+              <a:schemeClr val="lt1"/>
+            </a:fontRef>
+          </p:style>
+          <p:txBody>
+            <a:bodyPr lIns="0" tIns="0" rIns="0" bIns="0" rtlCol="0" anchor="ctr"/>
+            <a:lstStyle/>
+            <a:p>
+              <a:pPr algn="ctr"/>
+              <a:r>
+                <a:rPr lang="en-US" dirty="0" smtClean="0">
+                  <a:solidFill>
+                    <a:schemeClr val="tx1"/>
+                  </a:solidFill>
+                </a:rPr>
+                <a:t>Tempo-</a:t>
+              </a:r>
+              <a:r>
+                <a:rPr lang="en-US" dirty="0" err="1" smtClean="0">
+                  <a:solidFill>
+                    <a:schemeClr val="tx1"/>
+                  </a:solidFill>
+                </a:rPr>
+                <a:t>risation</a:t>
+              </a:r>
+              <a:endParaRPr lang="en-US" dirty="0">
+                <a:solidFill>
+                  <a:schemeClr val="tx1"/>
+                </a:solidFill>
+              </a:endParaRPr>
+            </a:p>
+          </p:txBody>
+        </p:sp>
+        <p:cxnSp>
+          <p:nvCxnSpPr>
+            <p:cNvPr id="121" name="Connecteur droit avec flèche 120"/>
+            <p:cNvCxnSpPr>
+              <a:stCxn id="115" idx="4"/>
+              <a:endCxn id="70" idx="0"/>
+            </p:cNvCxnSpPr>
+            <p:nvPr/>
+          </p:nvCxnSpPr>
+          <p:spPr>
+            <a:xfrm>
+              <a:off x="6155896" y="5609178"/>
+              <a:ext cx="0" cy="362507"/>
+            </a:xfrm>
+            <a:prstGeom prst="straightConnector1">
+              <a:avLst/>
+            </a:prstGeom>
+            <a:ln>
+              <a:solidFill>
+                <a:schemeClr val="tx1"/>
+              </a:solidFill>
+              <a:tailEnd type="triangle" w="lg" len="lg"/>
+            </a:ln>
+          </p:spPr>
+          <p:style>
+            <a:lnRef idx="1">
+              <a:schemeClr val="accent1"/>
+            </a:lnRef>
+            <a:fillRef idx="0">
+              <a:schemeClr val="accent1"/>
+            </a:fillRef>
+            <a:effectRef idx="0">
+              <a:schemeClr val="accent1"/>
+            </a:effectRef>
+            <a:fontRef idx="minor">
+              <a:schemeClr val="tx1"/>
+            </a:fontRef>
+          </p:style>
+        </p:cxnSp>
+        <p:sp>
+          <p:nvSpPr>
+            <p:cNvPr id="130" name="Ellipse 129"/>
+            <p:cNvSpPr/>
+            <p:nvPr/>
+          </p:nvSpPr>
+          <p:spPr>
+            <a:xfrm>
+              <a:off x="8425916" y="1770786"/>
+              <a:ext cx="1600200" cy="783771"/>
+            </a:xfrm>
+            <a:prstGeom prst="ellipse">
+              <a:avLst/>
+            </a:prstGeom>
+            <a:noFill/>
+            <a:ln>
+              <a:solidFill>
+                <a:schemeClr val="tx1"/>
+              </a:solidFill>
+            </a:ln>
+          </p:spPr>
+          <p:style>
+            <a:lnRef idx="2">
+              <a:schemeClr val="accent1">
+                <a:shade val="50000"/>
+              </a:schemeClr>
+            </a:lnRef>
+            <a:fillRef idx="1">
+              <a:schemeClr val="accent1"/>
+            </a:fillRef>
+            <a:effectRef idx="0">
+              <a:schemeClr val="accent1"/>
+            </a:effectRef>
+            <a:fontRef idx="minor">
+              <a:schemeClr val="lt1"/>
+            </a:fontRef>
+          </p:style>
+          <p:txBody>
+            <a:bodyPr lIns="0" tIns="0" rIns="0" bIns="0" rtlCol="0" anchor="ctr"/>
+            <a:lstStyle/>
+            <a:p>
+              <a:pPr algn="ctr"/>
+              <a:r>
+                <a:rPr lang="en-US" dirty="0" err="1" smtClean="0">
+                  <a:solidFill>
+                    <a:schemeClr val="tx1"/>
+                  </a:solidFill>
+                </a:rPr>
+                <a:t>Attente</a:t>
+              </a:r>
+              <a:endParaRPr lang="en-US" dirty="0" smtClean="0">
+                <a:solidFill>
+                  <a:schemeClr val="tx1"/>
+                </a:solidFill>
+              </a:endParaRPr>
+            </a:p>
+            <a:p>
+              <a:pPr algn="ctr"/>
+              <a:endParaRPr lang="en-US" dirty="0">
+                <a:solidFill>
+                  <a:schemeClr val="tx1"/>
+                </a:solidFill>
+              </a:endParaRPr>
+            </a:p>
+          </p:txBody>
+        </p:sp>
+        <p:cxnSp>
+          <p:nvCxnSpPr>
+            <p:cNvPr id="132" name="Connecteur droit avec flèche 131"/>
+            <p:cNvCxnSpPr>
+              <a:stCxn id="130" idx="1"/>
+              <a:endCxn id="47" idx="0"/>
+            </p:cNvCxnSpPr>
+            <p:nvPr/>
+          </p:nvCxnSpPr>
+          <p:spPr>
+            <a:xfrm flipH="1">
+              <a:off x="7625816" y="1885567"/>
+              <a:ext cx="1034444" cy="263213"/>
+            </a:xfrm>
+            <a:prstGeom prst="straightConnector1">
+              <a:avLst/>
+            </a:prstGeom>
+            <a:ln>
+              <a:solidFill>
+                <a:schemeClr val="tx1"/>
+              </a:solidFill>
+              <a:tailEnd type="triangle" w="lg" len="lg"/>
+            </a:ln>
+          </p:spPr>
+          <p:style>
+            <a:lnRef idx="1">
+              <a:schemeClr val="accent1"/>
+            </a:lnRef>
+            <a:fillRef idx="0">
+              <a:schemeClr val="accent1"/>
+            </a:fillRef>
+            <a:effectRef idx="0">
+              <a:schemeClr val="accent1"/>
+            </a:effectRef>
+            <a:fontRef idx="minor">
+              <a:schemeClr val="tx1"/>
+            </a:fontRef>
+          </p:style>
+        </p:cxnSp>
+        <p:cxnSp>
+          <p:nvCxnSpPr>
+            <p:cNvPr id="134" name="Connecteur droit avec flèche 133"/>
+            <p:cNvCxnSpPr>
+              <a:stCxn id="38" idx="3"/>
+              <a:endCxn id="130" idx="0"/>
+            </p:cNvCxnSpPr>
+            <p:nvPr/>
+          </p:nvCxnSpPr>
+          <p:spPr>
+            <a:xfrm flipH="1">
+              <a:off x="9226016" y="1608257"/>
+              <a:ext cx="293842" cy="162529"/>
+            </a:xfrm>
+            <a:prstGeom prst="straightConnector1">
+              <a:avLst/>
+            </a:prstGeom>
+            <a:ln>
+              <a:solidFill>
+                <a:schemeClr val="tx1"/>
+              </a:solidFill>
+              <a:tailEnd type="triangle" w="lg" len="lg"/>
+            </a:ln>
+          </p:spPr>
+          <p:style>
+            <a:lnRef idx="1">
+              <a:schemeClr val="accent1"/>
+            </a:lnRef>
+            <a:fillRef idx="0">
+              <a:schemeClr val="accent1"/>
+            </a:fillRef>
+            <a:effectRef idx="0">
+              <a:schemeClr val="accent1"/>
+            </a:effectRef>
+            <a:fontRef idx="minor">
+              <a:schemeClr val="tx1"/>
+            </a:fontRef>
+          </p:style>
+        </p:cxnSp>
+        <p:sp>
+          <p:nvSpPr>
+            <p:cNvPr id="136" name="ZoneTexte 135"/>
+            <p:cNvSpPr txBox="1"/>
+            <p:nvPr/>
+          </p:nvSpPr>
+          <p:spPr>
+            <a:xfrm>
+              <a:off x="7305174" y="1757993"/>
+              <a:ext cx="1055802" cy="276999"/>
+            </a:xfrm>
+            <a:prstGeom prst="rect">
+              <a:avLst/>
+            </a:prstGeom>
+            <a:noFill/>
+          </p:spPr>
+          <p:txBody>
+            <a:bodyPr wrap="none" rtlCol="0">
+              <a:spAutoFit/>
+            </a:bodyPr>
+            <a:lstStyle/>
+            <a:p>
+              <a:r>
+                <a:rPr lang="en-US" sz="1200" dirty="0" smtClean="0"/>
+                <a:t>SYN/SYN, ACK</a:t>
+              </a:r>
+              <a:endParaRPr lang="en-US" sz="1200" dirty="0"/>
+            </a:p>
+          </p:txBody>
+        </p:sp>
+      </p:grpSp>
+    </p:spTree>
+    <p:extLst>
+      <p:ext uri="{BB962C8B-B14F-4D97-AF65-F5344CB8AC3E}">
+        <p14:creationId xmlns:p14="http://schemas.microsoft.com/office/powerpoint/2010/main" val="2367788928"/>
       </p:ext>
     </p:extLst>
   </p:cSld>

</xml_diff>